<commit_message>
added stuff to powerpoint
</commit_message>
<xml_diff>
--- a/Staroids.pptx
+++ b/Staroids.pptx
@@ -9,8 +9,7 @@
     <p:sldId id="257" r:id="rId3"/>
     <p:sldId id="258" r:id="rId4"/>
     <p:sldId id="260" r:id="rId5"/>
-    <p:sldId id="261" r:id="rId6"/>
-    <p:sldId id="259" r:id="rId7"/>
+    <p:sldId id="259" r:id="rId6"/>
   </p:sldIdLst>
   <p:sldSz cx="12192000" cy="6858000"/>
   <p:notesSz cx="6858000" cy="9144000"/>
@@ -110,10 +109,6 @@
     </a:lvl9pPr>
   </p:defaultTextStyle>
 </p:presentation>
-</file>
-
-<file path=ppt/revisionInfo.xml><?xml version="1.0" encoding="utf-8"?>
-<p1510:revInfo xmlns:a="http://schemas.openxmlformats.org/drawingml/2006/main" xmlns:r="http://schemas.openxmlformats.org/officeDocument/2006/relationships" xmlns:p1510="http://schemas.microsoft.com/office/powerpoint/2015/10/main"/>
 </file>
 
 <file path=ppt/slideLayouts/slideLayout1.xml><?xml version="1.0" encoding="utf-8"?>
@@ -5875,23 +5870,27 @@
         </p:nvSpPr>
         <p:spPr/>
         <p:txBody>
-          <a:bodyPr/>
+          <a:bodyPr>
+            <a:normAutofit/>
+          </a:bodyPr>
           <a:lstStyle/>
           <a:p>
             <a:r>
               <a:rPr lang="en-CA" dirty="0"/>
-              <a:t>The project is a reimplementation of the arcade </a:t>
-            </a:r>
-            <a:r>
-              <a:rPr lang="en-CA"/>
-              <a:t>game Asteroids</a:t>
-            </a:r>
-          </a:p>
-          <a:p>
-            <a:endParaRPr lang="en-CA" dirty="0"/>
-          </a:p>
-          <a:p>
-            <a:endParaRPr lang="en-CA" dirty="0"/>
+              <a:t>The project is a reimplementation of HTML-5 Asteroids by Doug McInnis</a:t>
+            </a:r>
+          </a:p>
+          <a:p>
+            <a:r>
+              <a:rPr lang="en-CA" dirty="0"/>
+              <a:t>The focus of this project was the process</a:t>
+            </a:r>
+          </a:p>
+          <a:p>
+            <a:r>
+              <a:rPr lang="en-CA" dirty="0"/>
+              <a:t>Why Asteroids?</a:t>
+            </a:r>
           </a:p>
         </p:txBody>
       </p:sp>
@@ -5948,7 +5947,7 @@
           <a:p>
             <a:r>
               <a:rPr lang="en-CA" dirty="0"/>
-              <a:t>Discussion </a:t>
+              <a:t>Design Choices</a:t>
             </a:r>
           </a:p>
         </p:txBody>
@@ -5974,7 +5973,31 @@
           <a:bodyPr/>
           <a:lstStyle/>
           <a:p>
-            <a:endParaRPr lang="en-CA"/>
+            <a:r>
+              <a:rPr lang="en-CA" dirty="0"/>
+              <a:t>Software Qualities we tried to keep in mind when designing our project:</a:t>
+            </a:r>
+          </a:p>
+          <a:p>
+            <a:pPr lvl="1"/>
+            <a:r>
+              <a:rPr lang="en-CA" dirty="0"/>
+              <a:t>Modularity</a:t>
+            </a:r>
+          </a:p>
+          <a:p>
+            <a:pPr lvl="1"/>
+            <a:r>
+              <a:rPr lang="en-CA" dirty="0"/>
+              <a:t>Portability </a:t>
+            </a:r>
+          </a:p>
+          <a:p>
+            <a:pPr lvl="1"/>
+            <a:r>
+              <a:rPr lang="en-CA" dirty="0"/>
+              <a:t>Usability</a:t>
+            </a:r>
           </a:p>
         </p:txBody>
       </p:sp>
@@ -6029,7 +6052,10 @@
           <a:bodyPr/>
           <a:lstStyle/>
           <a:p>
-            <a:endParaRPr lang="en-CA"/>
+            <a:r>
+              <a:rPr lang="en-CA" dirty="0"/>
+              <a:t>Demo</a:t>
+            </a:r>
           </a:p>
         </p:txBody>
       </p:sp>
@@ -6054,7 +6080,7 @@
           <a:bodyPr/>
           <a:lstStyle/>
           <a:p>
-            <a:endParaRPr lang="en-CA"/>
+            <a:endParaRPr lang="en-CA" dirty="0"/>
           </a:p>
         </p:txBody>
       </p:sp>
@@ -6093,86 +6119,6 @@
           <p:cNvPr id="2" name="Title 1">
             <a:extLst>
               <a:ext uri="{FF2B5EF4-FFF2-40B4-BE49-F238E27FC236}">
-                <a16:creationId xmlns:a16="http://schemas.microsoft.com/office/drawing/2014/main" id="{59C872CF-87E4-4813-B97E-6B6633CADE82}"/>
-              </a:ext>
-            </a:extLst>
-          </p:cNvPr>
-          <p:cNvSpPr>
-            <a:spLocks noGrp="1"/>
-          </p:cNvSpPr>
-          <p:nvPr>
-            <p:ph type="title"/>
-          </p:nvPr>
-        </p:nvSpPr>
-        <p:spPr/>
-        <p:txBody>
-          <a:bodyPr/>
-          <a:lstStyle/>
-          <a:p>
-            <a:endParaRPr lang="en-CA"/>
-          </a:p>
-        </p:txBody>
-      </p:sp>
-      <p:sp>
-        <p:nvSpPr>
-          <p:cNvPr id="3" name="Content Placeholder 2">
-            <a:extLst>
-              <a:ext uri="{FF2B5EF4-FFF2-40B4-BE49-F238E27FC236}">
-                <a16:creationId xmlns:a16="http://schemas.microsoft.com/office/drawing/2014/main" id="{D3571BEE-2F38-4C74-94F3-01C562ED9807}"/>
-              </a:ext>
-            </a:extLst>
-          </p:cNvPr>
-          <p:cNvSpPr>
-            <a:spLocks noGrp="1"/>
-          </p:cNvSpPr>
-          <p:nvPr>
-            <p:ph idx="1"/>
-          </p:nvPr>
-        </p:nvSpPr>
-        <p:spPr/>
-        <p:txBody>
-          <a:bodyPr/>
-          <a:lstStyle/>
-          <a:p>
-            <a:endParaRPr lang="en-CA"/>
-          </a:p>
-        </p:txBody>
-      </p:sp>
-    </p:spTree>
-    <p:extLst>
-      <p:ext uri="{BB962C8B-B14F-4D97-AF65-F5344CB8AC3E}">
-        <p14:creationId xmlns:p14="http://schemas.microsoft.com/office/powerpoint/2010/main" val="3763264448"/>
-      </p:ext>
-    </p:extLst>
-  </p:cSld>
-  <p:clrMapOvr>
-    <a:masterClrMapping/>
-  </p:clrMapOvr>
-</p:sld>
-</file>
-
-<file path=ppt/slides/slide6.xml><?xml version="1.0" encoding="utf-8"?>
-<p:sld xmlns:a="http://schemas.openxmlformats.org/drawingml/2006/main" xmlns:r="http://schemas.openxmlformats.org/officeDocument/2006/relationships" xmlns:p="http://schemas.openxmlformats.org/presentationml/2006/main">
-  <p:cSld>
-    <p:spTree>
-      <p:nvGrpSpPr>
-        <p:cNvPr id="1" name=""/>
-        <p:cNvGrpSpPr/>
-        <p:nvPr/>
-      </p:nvGrpSpPr>
-      <p:grpSpPr>
-        <a:xfrm>
-          <a:off x="0" y="0"/>
-          <a:ext cx="0" cy="0"/>
-          <a:chOff x="0" y="0"/>
-          <a:chExt cx="0" cy="0"/>
-        </a:xfrm>
-      </p:grpSpPr>
-      <p:sp>
-        <p:nvSpPr>
-          <p:cNvPr id="2" name="Title 1">
-            <a:extLst>
-              <a:ext uri="{FF2B5EF4-FFF2-40B4-BE49-F238E27FC236}">
                 <a16:creationId xmlns:a16="http://schemas.microsoft.com/office/drawing/2014/main" id="{2EE0101C-CA7C-412A-927B-04CF6F8F9109}"/>
               </a:ext>
             </a:extLst>
@@ -6217,7 +6163,10 @@
           <a:bodyPr/>
           <a:lstStyle/>
           <a:p>
-            <a:endParaRPr lang="en-CA"/>
+            <a:r>
+              <a:rPr lang="en-CA" dirty="0"/>
+              <a:t>Emphasize special features</a:t>
+            </a:r>
           </a:p>
         </p:txBody>
       </p:sp>

</xml_diff>

<commit_message>
powerpoint conclusion slide formatted
</commit_message>
<xml_diff>
--- a/Staroids.pptx
+++ b/Staroids.pptx
@@ -6177,6 +6177,481 @@
           </a:xfrm>
         </p:spPr>
       </p:pic>
+      <p:sp>
+        <p:nvSpPr>
+          <p:cNvPr id="13" name="Content Placeholder 2">
+            <a:extLst>
+              <a:ext uri="{FF2B5EF4-FFF2-40B4-BE49-F238E27FC236}">
+                <a16:creationId xmlns:a16="http://schemas.microsoft.com/office/drawing/2014/main" id="{D4F91155-0239-4595-9092-68C6C8274409}"/>
+              </a:ext>
+            </a:extLst>
+          </p:cNvPr>
+          <p:cNvSpPr txBox="1">
+            <a:spLocks/>
+          </p:cNvSpPr>
+          <p:nvPr/>
+        </p:nvSpPr>
+        <p:spPr>
+          <a:xfrm>
+            <a:off x="1141413" y="2666999"/>
+            <a:ext cx="6848157" cy="3124201"/>
+          </a:xfrm>
+          <a:prstGeom prst="rect">
+            <a:avLst/>
+          </a:prstGeom>
+        </p:spPr>
+        <p:txBody>
+          <a:bodyPr vert="horz" lIns="91440" tIns="45720" rIns="91440" bIns="45720" rtlCol="0" anchor="ctr">
+            <a:normAutofit/>
+          </a:bodyPr>
+          <a:lstStyle>
+            <a:lvl1pPr marL="285750" indent="-285750" algn="l" defTabSz="457200" rtl="0" eaLnBrk="1" latinLnBrk="0" hangingPunct="1">
+              <a:spcBef>
+                <a:spcPct val="20000"/>
+              </a:spcBef>
+              <a:spcAft>
+                <a:spcPts val="600"/>
+              </a:spcAft>
+              <a:buClr>
+                <a:schemeClr val="tx1"/>
+              </a:buClr>
+              <a:buSzPct val="100000"/>
+              <a:buFont typeface="Arial"/>
+              <a:buChar char="•"/>
+              <a:defRPr sz="2000" kern="1200" cap="small">
+                <a:gradFill flip="none" rotWithShape="1">
+                  <a:gsLst>
+                    <a:gs pos="0">
+                      <a:schemeClr val="tx1"/>
+                    </a:gs>
+                    <a:gs pos="100000">
+                      <a:schemeClr val="tx1">
+                        <a:lumMod val="75000"/>
+                      </a:schemeClr>
+                    </a:gs>
+                  </a:gsLst>
+                  <a:lin ang="5580000" scaled="0"/>
+                  <a:tileRect/>
+                </a:gradFill>
+                <a:effectLst>
+                  <a:glow rad="38100">
+                    <a:schemeClr val="bg1">
+                      <a:lumMod val="50000"/>
+                      <a:lumOff val="50000"/>
+                      <a:alpha val="20000"/>
+                    </a:schemeClr>
+                  </a:glow>
+                  <a:outerShdw blurRad="44450" dist="12700" dir="13860000" algn="tl" rotWithShape="0">
+                    <a:srgbClr val="000000">
+                      <a:alpha val="20000"/>
+                    </a:srgbClr>
+                  </a:outerShdw>
+                </a:effectLst>
+                <a:latin typeface="+mn-lt"/>
+                <a:ea typeface="+mn-ea"/>
+                <a:cs typeface="+mn-cs"/>
+              </a:defRPr>
+            </a:lvl1pPr>
+            <a:lvl2pPr marL="742950" indent="-285750" algn="l" defTabSz="457200" rtl="0" eaLnBrk="1" latinLnBrk="0" hangingPunct="1">
+              <a:spcBef>
+                <a:spcPct val="20000"/>
+              </a:spcBef>
+              <a:spcAft>
+                <a:spcPts val="600"/>
+              </a:spcAft>
+              <a:buClr>
+                <a:schemeClr val="tx1"/>
+              </a:buClr>
+              <a:buSzPct val="100000"/>
+              <a:buFont typeface="Arial"/>
+              <a:buChar char="•"/>
+              <a:defRPr sz="1800" kern="1200" cap="small">
+                <a:gradFill flip="none" rotWithShape="1">
+                  <a:gsLst>
+                    <a:gs pos="0">
+                      <a:schemeClr val="tx1"/>
+                    </a:gs>
+                    <a:gs pos="100000">
+                      <a:schemeClr val="tx1">
+                        <a:lumMod val="75000"/>
+                      </a:schemeClr>
+                    </a:gs>
+                  </a:gsLst>
+                  <a:lin ang="5580000" scaled="0"/>
+                  <a:tileRect/>
+                </a:gradFill>
+                <a:effectLst>
+                  <a:glow rad="38100">
+                    <a:schemeClr val="bg1">
+                      <a:lumMod val="50000"/>
+                      <a:lumOff val="50000"/>
+                      <a:alpha val="20000"/>
+                    </a:schemeClr>
+                  </a:glow>
+                  <a:outerShdw blurRad="44450" dist="12700" dir="13860000" algn="tl" rotWithShape="0">
+                    <a:srgbClr val="000000">
+                      <a:alpha val="20000"/>
+                    </a:srgbClr>
+                  </a:outerShdw>
+                </a:effectLst>
+                <a:latin typeface="+mn-lt"/>
+                <a:ea typeface="+mn-ea"/>
+                <a:cs typeface="+mn-cs"/>
+              </a:defRPr>
+            </a:lvl2pPr>
+            <a:lvl3pPr marL="1200150" indent="-285750" algn="l" defTabSz="457200" rtl="0" eaLnBrk="1" latinLnBrk="0" hangingPunct="1">
+              <a:spcBef>
+                <a:spcPct val="20000"/>
+              </a:spcBef>
+              <a:spcAft>
+                <a:spcPts val="600"/>
+              </a:spcAft>
+              <a:buClr>
+                <a:schemeClr val="tx1"/>
+              </a:buClr>
+              <a:buSzPct val="100000"/>
+              <a:buFont typeface="Arial"/>
+              <a:buChar char="•"/>
+              <a:defRPr sz="1600" kern="1200" cap="small">
+                <a:gradFill flip="none" rotWithShape="1">
+                  <a:gsLst>
+                    <a:gs pos="0">
+                      <a:schemeClr val="tx1"/>
+                    </a:gs>
+                    <a:gs pos="100000">
+                      <a:schemeClr val="tx1">
+                        <a:lumMod val="75000"/>
+                      </a:schemeClr>
+                    </a:gs>
+                  </a:gsLst>
+                  <a:lin ang="5580000" scaled="0"/>
+                  <a:tileRect/>
+                </a:gradFill>
+                <a:effectLst>
+                  <a:glow rad="38100">
+                    <a:schemeClr val="bg1">
+                      <a:lumMod val="50000"/>
+                      <a:lumOff val="50000"/>
+                      <a:alpha val="20000"/>
+                    </a:schemeClr>
+                  </a:glow>
+                  <a:outerShdw blurRad="44450" dist="12700" dir="13860000" algn="tl" rotWithShape="0">
+                    <a:srgbClr val="000000">
+                      <a:alpha val="20000"/>
+                    </a:srgbClr>
+                  </a:outerShdw>
+                </a:effectLst>
+                <a:latin typeface="+mn-lt"/>
+                <a:ea typeface="+mn-ea"/>
+                <a:cs typeface="+mn-cs"/>
+              </a:defRPr>
+            </a:lvl3pPr>
+            <a:lvl4pPr marL="1543050" indent="-171450" algn="l" defTabSz="457200" rtl="0" eaLnBrk="1" latinLnBrk="0" hangingPunct="1">
+              <a:spcBef>
+                <a:spcPct val="20000"/>
+              </a:spcBef>
+              <a:spcAft>
+                <a:spcPts val="600"/>
+              </a:spcAft>
+              <a:buClr>
+                <a:schemeClr val="tx1"/>
+              </a:buClr>
+              <a:buSzPct val="100000"/>
+              <a:buFont typeface="Arial"/>
+              <a:buChar char="•"/>
+              <a:defRPr sz="1400" kern="1200" cap="small">
+                <a:gradFill flip="none" rotWithShape="1">
+                  <a:gsLst>
+                    <a:gs pos="0">
+                      <a:schemeClr val="tx1"/>
+                    </a:gs>
+                    <a:gs pos="100000">
+                      <a:schemeClr val="tx1">
+                        <a:lumMod val="75000"/>
+                      </a:schemeClr>
+                    </a:gs>
+                  </a:gsLst>
+                  <a:lin ang="5580000" scaled="0"/>
+                  <a:tileRect/>
+                </a:gradFill>
+                <a:effectLst>
+                  <a:glow rad="38100">
+                    <a:schemeClr val="bg1">
+                      <a:lumMod val="50000"/>
+                      <a:lumOff val="50000"/>
+                      <a:alpha val="20000"/>
+                    </a:schemeClr>
+                  </a:glow>
+                  <a:outerShdw blurRad="44450" dist="12700" dir="13860000" algn="tl" rotWithShape="0">
+                    <a:srgbClr val="000000">
+                      <a:alpha val="20000"/>
+                    </a:srgbClr>
+                  </a:outerShdw>
+                </a:effectLst>
+                <a:latin typeface="+mn-lt"/>
+                <a:ea typeface="+mn-ea"/>
+                <a:cs typeface="+mn-cs"/>
+              </a:defRPr>
+            </a:lvl4pPr>
+            <a:lvl5pPr marL="2000250" indent="-171450" algn="l" defTabSz="457200" rtl="0" eaLnBrk="1" latinLnBrk="0" hangingPunct="1">
+              <a:spcBef>
+                <a:spcPct val="20000"/>
+              </a:spcBef>
+              <a:spcAft>
+                <a:spcPts val="600"/>
+              </a:spcAft>
+              <a:buClr>
+                <a:schemeClr val="tx1"/>
+              </a:buClr>
+              <a:buSzPct val="100000"/>
+              <a:buFont typeface="Arial"/>
+              <a:buChar char="•"/>
+              <a:defRPr sz="1400" kern="1200" cap="small">
+                <a:gradFill flip="none" rotWithShape="1">
+                  <a:gsLst>
+                    <a:gs pos="0">
+                      <a:schemeClr val="tx1"/>
+                    </a:gs>
+                    <a:gs pos="100000">
+                      <a:schemeClr val="tx1">
+                        <a:lumMod val="75000"/>
+                      </a:schemeClr>
+                    </a:gs>
+                  </a:gsLst>
+                  <a:lin ang="5580000" scaled="0"/>
+                  <a:tileRect/>
+                </a:gradFill>
+                <a:effectLst>
+                  <a:glow rad="38100">
+                    <a:schemeClr val="bg1">
+                      <a:lumMod val="50000"/>
+                      <a:lumOff val="50000"/>
+                      <a:alpha val="20000"/>
+                    </a:schemeClr>
+                  </a:glow>
+                  <a:outerShdw blurRad="44450" dist="12700" dir="13860000" algn="tl" rotWithShape="0">
+                    <a:srgbClr val="000000">
+                      <a:alpha val="20000"/>
+                    </a:srgbClr>
+                  </a:outerShdw>
+                </a:effectLst>
+                <a:latin typeface="+mn-lt"/>
+                <a:ea typeface="+mn-ea"/>
+                <a:cs typeface="+mn-cs"/>
+              </a:defRPr>
+            </a:lvl5pPr>
+            <a:lvl6pPr marL="2514600" indent="-228600" algn="l" defTabSz="457200" rtl="0" eaLnBrk="1" latinLnBrk="0" hangingPunct="1">
+              <a:spcBef>
+                <a:spcPct val="20000"/>
+              </a:spcBef>
+              <a:spcAft>
+                <a:spcPts val="600"/>
+              </a:spcAft>
+              <a:buClr>
+                <a:schemeClr val="tx1"/>
+              </a:buClr>
+              <a:buSzPct val="100000"/>
+              <a:buFont typeface="Arial"/>
+              <a:buChar char="•"/>
+              <a:defRPr sz="1200" kern="1200" cap="small">
+                <a:gradFill flip="none" rotWithShape="1">
+                  <a:gsLst>
+                    <a:gs pos="0">
+                      <a:schemeClr val="tx1"/>
+                    </a:gs>
+                    <a:gs pos="100000">
+                      <a:schemeClr val="tx1">
+                        <a:lumMod val="75000"/>
+                      </a:schemeClr>
+                    </a:gs>
+                  </a:gsLst>
+                  <a:lin ang="5580000" scaled="0"/>
+                  <a:tileRect/>
+                </a:gradFill>
+                <a:effectLst>
+                  <a:glow rad="38100">
+                    <a:schemeClr val="bg1">
+                      <a:lumMod val="50000"/>
+                      <a:lumOff val="50000"/>
+                      <a:alpha val="20000"/>
+                    </a:schemeClr>
+                  </a:glow>
+                  <a:outerShdw blurRad="44450" dist="12700" dir="13860000" algn="tl" rotWithShape="0">
+                    <a:srgbClr val="000000">
+                      <a:alpha val="20000"/>
+                    </a:srgbClr>
+                  </a:outerShdw>
+                </a:effectLst>
+                <a:latin typeface="+mn-lt"/>
+                <a:ea typeface="+mn-ea"/>
+                <a:cs typeface="+mn-cs"/>
+              </a:defRPr>
+            </a:lvl6pPr>
+            <a:lvl7pPr marL="2971800" indent="-228600" algn="l" defTabSz="457200" rtl="0" eaLnBrk="1" latinLnBrk="0" hangingPunct="1">
+              <a:spcBef>
+                <a:spcPct val="20000"/>
+              </a:spcBef>
+              <a:spcAft>
+                <a:spcPts val="600"/>
+              </a:spcAft>
+              <a:buClr>
+                <a:schemeClr val="tx1"/>
+              </a:buClr>
+              <a:buSzPct val="100000"/>
+              <a:buFont typeface="Arial"/>
+              <a:buChar char="•"/>
+              <a:defRPr sz="1200" kern="1200" cap="small">
+                <a:gradFill flip="none" rotWithShape="1">
+                  <a:gsLst>
+                    <a:gs pos="0">
+                      <a:schemeClr val="tx1"/>
+                    </a:gs>
+                    <a:gs pos="100000">
+                      <a:schemeClr val="tx1">
+                        <a:lumMod val="75000"/>
+                      </a:schemeClr>
+                    </a:gs>
+                  </a:gsLst>
+                  <a:lin ang="5580000" scaled="0"/>
+                  <a:tileRect/>
+                </a:gradFill>
+                <a:effectLst>
+                  <a:glow rad="38100">
+                    <a:schemeClr val="bg1">
+                      <a:lumMod val="50000"/>
+                      <a:lumOff val="50000"/>
+                      <a:alpha val="20000"/>
+                    </a:schemeClr>
+                  </a:glow>
+                  <a:outerShdw blurRad="44450" dist="12700" dir="13860000" algn="tl" rotWithShape="0">
+                    <a:srgbClr val="000000">
+                      <a:alpha val="20000"/>
+                    </a:srgbClr>
+                  </a:outerShdw>
+                </a:effectLst>
+                <a:latin typeface="+mn-lt"/>
+                <a:ea typeface="+mn-ea"/>
+                <a:cs typeface="+mn-cs"/>
+              </a:defRPr>
+            </a:lvl7pPr>
+            <a:lvl8pPr marL="3429000" indent="-228600" algn="l" defTabSz="457200" rtl="0" eaLnBrk="1" latinLnBrk="0" hangingPunct="1">
+              <a:spcBef>
+                <a:spcPct val="20000"/>
+              </a:spcBef>
+              <a:spcAft>
+                <a:spcPts val="600"/>
+              </a:spcAft>
+              <a:buClr>
+                <a:schemeClr val="tx1"/>
+              </a:buClr>
+              <a:buSzPct val="100000"/>
+              <a:buFont typeface="Arial"/>
+              <a:buChar char="•"/>
+              <a:defRPr sz="1200" kern="1200" cap="small">
+                <a:gradFill flip="none" rotWithShape="1">
+                  <a:gsLst>
+                    <a:gs pos="0">
+                      <a:schemeClr val="tx1"/>
+                    </a:gs>
+                    <a:gs pos="100000">
+                      <a:schemeClr val="tx1">
+                        <a:lumMod val="75000"/>
+                      </a:schemeClr>
+                    </a:gs>
+                  </a:gsLst>
+                  <a:lin ang="5580000" scaled="0"/>
+                  <a:tileRect/>
+                </a:gradFill>
+                <a:effectLst>
+                  <a:glow rad="38100">
+                    <a:schemeClr val="bg1">
+                      <a:lumMod val="50000"/>
+                      <a:lumOff val="50000"/>
+                      <a:alpha val="20000"/>
+                    </a:schemeClr>
+                  </a:glow>
+                  <a:outerShdw blurRad="44450" dist="12700" dir="13860000" algn="tl" rotWithShape="0">
+                    <a:srgbClr val="000000">
+                      <a:alpha val="20000"/>
+                    </a:srgbClr>
+                  </a:outerShdw>
+                </a:effectLst>
+                <a:latin typeface="+mn-lt"/>
+                <a:ea typeface="+mn-ea"/>
+                <a:cs typeface="+mn-cs"/>
+              </a:defRPr>
+            </a:lvl8pPr>
+            <a:lvl9pPr marL="3886200" indent="-228600" algn="l" defTabSz="457200" rtl="0" eaLnBrk="1" latinLnBrk="0" hangingPunct="1">
+              <a:spcBef>
+                <a:spcPct val="20000"/>
+              </a:spcBef>
+              <a:spcAft>
+                <a:spcPts val="600"/>
+              </a:spcAft>
+              <a:buClr>
+                <a:schemeClr val="tx1"/>
+              </a:buClr>
+              <a:buSzPct val="100000"/>
+              <a:buFont typeface="Arial"/>
+              <a:buChar char="•"/>
+              <a:defRPr sz="1200" kern="1200" cap="small">
+                <a:gradFill flip="none" rotWithShape="1">
+                  <a:gsLst>
+                    <a:gs pos="0">
+                      <a:schemeClr val="tx1"/>
+                    </a:gs>
+                    <a:gs pos="100000">
+                      <a:schemeClr val="tx1">
+                        <a:lumMod val="75000"/>
+                      </a:schemeClr>
+                    </a:gs>
+                  </a:gsLst>
+                  <a:lin ang="5580000" scaled="0"/>
+                  <a:tileRect/>
+                </a:gradFill>
+                <a:effectLst>
+                  <a:glow rad="38100">
+                    <a:schemeClr val="bg1">
+                      <a:lumMod val="50000"/>
+                      <a:lumOff val="50000"/>
+                      <a:alpha val="20000"/>
+                    </a:schemeClr>
+                  </a:glow>
+                  <a:outerShdw blurRad="44450" dist="12700" dir="13860000" algn="tl" rotWithShape="0">
+                    <a:srgbClr val="000000">
+                      <a:alpha val="20000"/>
+                    </a:srgbClr>
+                  </a:outerShdw>
+                </a:effectLst>
+                <a:latin typeface="+mn-lt"/>
+                <a:ea typeface="+mn-ea"/>
+                <a:cs typeface="+mn-cs"/>
+              </a:defRPr>
+            </a:lvl9pPr>
+          </a:lstStyle>
+          <a:p>
+            <a:r>
+              <a:rPr lang="en-CA" dirty="0" err="1"/>
+              <a:t>Sfdsfklsj</a:t>
+            </a:r>
+            <a:endParaRPr lang="en-CA" dirty="0"/>
+          </a:p>
+          <a:p>
+            <a:r>
+              <a:rPr lang="en-CA" dirty="0" err="1"/>
+              <a:t>Lkjslf</a:t>
+            </a:r>
+            <a:endParaRPr lang="en-CA" dirty="0"/>
+          </a:p>
+          <a:p>
+            <a:r>
+              <a:rPr lang="en-CA" dirty="0" err="1"/>
+              <a:t>kljsfl</a:t>
+            </a:r>
+            <a:endParaRPr lang="en-CA" dirty="0"/>
+          </a:p>
+        </p:txBody>
+      </p:sp>
     </p:spTree>
     <p:extLst>
       <p:ext uri="{BB962C8B-B14F-4D97-AF65-F5344CB8AC3E}">

</xml_diff>